<commit_message>
Add google maps fetch requests
</commit_message>
<xml_diff>
--- a/Mockups.pptx
+++ b/Mockups.pptx
@@ -261,7 +261,7 @@
           <a:p>
             <a:fld id="{6F2DD505-E694-4C23-8402-9C491DB3C5BA}" type="datetimeFigureOut">
               <a:rPr lang="en-US" smtClean="0"/>
-              <a:t>7/23/2024</a:t>
+              <a:t>7/25/2024</a:t>
             </a:fld>
             <a:endParaRPr lang="en-US"/>
           </a:p>
@@ -459,7 +459,7 @@
           <a:p>
             <a:fld id="{6F2DD505-E694-4C23-8402-9C491DB3C5BA}" type="datetimeFigureOut">
               <a:rPr lang="en-US" smtClean="0"/>
-              <a:t>7/23/2024</a:t>
+              <a:t>7/25/2024</a:t>
             </a:fld>
             <a:endParaRPr lang="en-US"/>
           </a:p>
@@ -667,7 +667,7 @@
           <a:p>
             <a:fld id="{6F2DD505-E694-4C23-8402-9C491DB3C5BA}" type="datetimeFigureOut">
               <a:rPr lang="en-US" smtClean="0"/>
-              <a:t>7/23/2024</a:t>
+              <a:t>7/25/2024</a:t>
             </a:fld>
             <a:endParaRPr lang="en-US"/>
           </a:p>
@@ -865,7 +865,7 @@
           <a:p>
             <a:fld id="{6F2DD505-E694-4C23-8402-9C491DB3C5BA}" type="datetimeFigureOut">
               <a:rPr lang="en-US" smtClean="0"/>
-              <a:t>7/23/2024</a:t>
+              <a:t>7/25/2024</a:t>
             </a:fld>
             <a:endParaRPr lang="en-US"/>
           </a:p>
@@ -1140,7 +1140,7 @@
           <a:p>
             <a:fld id="{6F2DD505-E694-4C23-8402-9C491DB3C5BA}" type="datetimeFigureOut">
               <a:rPr lang="en-US" smtClean="0"/>
-              <a:t>7/23/2024</a:t>
+              <a:t>7/25/2024</a:t>
             </a:fld>
             <a:endParaRPr lang="en-US"/>
           </a:p>
@@ -1405,7 +1405,7 @@
           <a:p>
             <a:fld id="{6F2DD505-E694-4C23-8402-9C491DB3C5BA}" type="datetimeFigureOut">
               <a:rPr lang="en-US" smtClean="0"/>
-              <a:t>7/23/2024</a:t>
+              <a:t>7/25/2024</a:t>
             </a:fld>
             <a:endParaRPr lang="en-US"/>
           </a:p>
@@ -1817,7 +1817,7 @@
           <a:p>
             <a:fld id="{6F2DD505-E694-4C23-8402-9C491DB3C5BA}" type="datetimeFigureOut">
               <a:rPr lang="en-US" smtClean="0"/>
-              <a:t>7/23/2024</a:t>
+              <a:t>7/25/2024</a:t>
             </a:fld>
             <a:endParaRPr lang="en-US"/>
           </a:p>
@@ -1958,7 +1958,7 @@
           <a:p>
             <a:fld id="{6F2DD505-E694-4C23-8402-9C491DB3C5BA}" type="datetimeFigureOut">
               <a:rPr lang="en-US" smtClean="0"/>
-              <a:t>7/23/2024</a:t>
+              <a:t>7/25/2024</a:t>
             </a:fld>
             <a:endParaRPr lang="en-US"/>
           </a:p>
@@ -2071,7 +2071,7 @@
           <a:p>
             <a:fld id="{6F2DD505-E694-4C23-8402-9C491DB3C5BA}" type="datetimeFigureOut">
               <a:rPr lang="en-US" smtClean="0"/>
-              <a:t>7/23/2024</a:t>
+              <a:t>7/25/2024</a:t>
             </a:fld>
             <a:endParaRPr lang="en-US"/>
           </a:p>
@@ -2382,7 +2382,7 @@
           <a:p>
             <a:fld id="{6F2DD505-E694-4C23-8402-9C491DB3C5BA}" type="datetimeFigureOut">
               <a:rPr lang="en-US" smtClean="0"/>
-              <a:t>7/23/2024</a:t>
+              <a:t>7/25/2024</a:t>
             </a:fld>
             <a:endParaRPr lang="en-US"/>
           </a:p>
@@ -2670,7 +2670,7 @@
           <a:p>
             <a:fld id="{6F2DD505-E694-4C23-8402-9C491DB3C5BA}" type="datetimeFigureOut">
               <a:rPr lang="en-US" smtClean="0"/>
-              <a:t>7/23/2024</a:t>
+              <a:t>7/25/2024</a:t>
             </a:fld>
             <a:endParaRPr lang="en-US"/>
           </a:p>
@@ -2911,7 +2911,7 @@
           <a:p>
             <a:fld id="{6F2DD505-E694-4C23-8402-9C491DB3C5BA}" type="datetimeFigureOut">
               <a:rPr lang="en-US" smtClean="0"/>
-              <a:t>7/23/2024</a:t>
+              <a:t>7/25/2024</a:t>
             </a:fld>
             <a:endParaRPr lang="en-US"/>
           </a:p>
@@ -3402,7 +3402,7 @@
               <a:buAutoNum type="arabicPeriod"/>
             </a:pPr>
             <a:r>
-              <a:rPr lang="en-US" dirty="0">
+              <a:rPr lang="en-US" strike="sngStrike" dirty="0">
                 <a:highlight>
                   <a:srgbClr val="00FFFF"/>
                 </a:highlight>
@@ -3416,7 +3416,7 @@
               <a:buAutoNum type="arabicPeriod"/>
             </a:pPr>
             <a:r>
-              <a:rPr lang="en-US" dirty="0">
+              <a:rPr lang="en-US" strike="sngStrike" dirty="0">
                 <a:highlight>
                   <a:srgbClr val="00FFFF"/>
                 </a:highlight>
@@ -3430,7 +3430,7 @@
               <a:buAutoNum type="arabicPeriod"/>
             </a:pPr>
             <a:r>
-              <a:rPr lang="en-US" dirty="0">
+              <a:rPr lang="en-US" strike="sngStrike" dirty="0">
                 <a:highlight>
                   <a:srgbClr val="00FFFF"/>
                 </a:highlight>

</xml_diff>

<commit_message>
Change out exposed api keys
</commit_message>
<xml_diff>
--- a/Mockups.pptx
+++ b/Mockups.pptx
@@ -3378,7 +3378,7 @@
         <p:spPr>
           <a:xfrm>
             <a:off x="816076" y="1641987"/>
-            <a:ext cx="10087897" cy="4524315"/>
+            <a:ext cx="10087897" cy="4247317"/>
           </a:xfrm>
           <a:prstGeom prst="rect">
             <a:avLst/>
@@ -3449,7 +3449,7 @@
                   <a:srgbClr val="00FFFF"/>
                 </a:highlight>
               </a:rPr>
-              <a:t>Use binary search to find the closest L&amp;Ls to the target value</a:t>
+              <a:t>Use binary search to find the closest L&amp;L to the target value</a:t>
             </a:r>
           </a:p>
           <a:p>
@@ -3463,11 +3463,11 @@
                   <a:srgbClr val="00FFFF"/>
                 </a:highlight>
               </a:rPr>
-              <a:t>Find closest value, then compare to new address L&amp;L</a:t>
-            </a:r>
-          </a:p>
-          <a:p>
-            <a:pPr marL="1257300" lvl="2" indent="-342900">
+              <a:t>Once the closest value is found, iterate up and down in the JSON object</a:t>
+            </a:r>
+          </a:p>
+          <a:p>
+            <a:pPr marL="800100" lvl="1" indent="-342900">
               <a:buFont typeface="+mj-lt"/>
               <a:buAutoNum type="arabicPeriod"/>
             </a:pPr>
@@ -3477,21 +3477,7 @@
                   <a:srgbClr val="00FFFF"/>
                 </a:highlight>
               </a:rPr>
-              <a:t>If it’s within 0.5 mile of both L&amp;L, add it to return object</a:t>
-            </a:r>
-          </a:p>
-          <a:p>
-            <a:pPr marL="1257300" lvl="2" indent="-342900">
-              <a:buFont typeface="+mj-lt"/>
-              <a:buAutoNum type="arabicPeriod"/>
-            </a:pPr>
-            <a:r>
-              <a:rPr lang="en-US" dirty="0">
-                <a:highlight>
-                  <a:srgbClr val="00FFFF"/>
-                </a:highlight>
-              </a:rPr>
-              <a:t>If not, end binary search function</a:t>
+              <a:t>Create a new array containing all of the values that are within the latitude equivalent of 0.5 miles</a:t>
             </a:r>
           </a:p>
           <a:p>

</xml_diff>

<commit_message>
Add crime marker display
</commit_message>
<xml_diff>
--- a/Mockups.pptx
+++ b/Mockups.pptx
@@ -261,7 +261,7 @@
           <a:p>
             <a:fld id="{6F2DD505-E694-4C23-8402-9C491DB3C5BA}" type="datetimeFigureOut">
               <a:rPr lang="en-US" smtClean="0"/>
-              <a:t>7/25/2024</a:t>
+              <a:t>7/31/2024</a:t>
             </a:fld>
             <a:endParaRPr lang="en-US"/>
           </a:p>
@@ -459,7 +459,7 @@
           <a:p>
             <a:fld id="{6F2DD505-E694-4C23-8402-9C491DB3C5BA}" type="datetimeFigureOut">
               <a:rPr lang="en-US" smtClean="0"/>
-              <a:t>7/25/2024</a:t>
+              <a:t>7/31/2024</a:t>
             </a:fld>
             <a:endParaRPr lang="en-US"/>
           </a:p>
@@ -667,7 +667,7 @@
           <a:p>
             <a:fld id="{6F2DD505-E694-4C23-8402-9C491DB3C5BA}" type="datetimeFigureOut">
               <a:rPr lang="en-US" smtClean="0"/>
-              <a:t>7/25/2024</a:t>
+              <a:t>7/31/2024</a:t>
             </a:fld>
             <a:endParaRPr lang="en-US"/>
           </a:p>
@@ -865,7 +865,7 @@
           <a:p>
             <a:fld id="{6F2DD505-E694-4C23-8402-9C491DB3C5BA}" type="datetimeFigureOut">
               <a:rPr lang="en-US" smtClean="0"/>
-              <a:t>7/25/2024</a:t>
+              <a:t>7/31/2024</a:t>
             </a:fld>
             <a:endParaRPr lang="en-US"/>
           </a:p>
@@ -1140,7 +1140,7 @@
           <a:p>
             <a:fld id="{6F2DD505-E694-4C23-8402-9C491DB3C5BA}" type="datetimeFigureOut">
               <a:rPr lang="en-US" smtClean="0"/>
-              <a:t>7/25/2024</a:t>
+              <a:t>7/31/2024</a:t>
             </a:fld>
             <a:endParaRPr lang="en-US"/>
           </a:p>
@@ -1405,7 +1405,7 @@
           <a:p>
             <a:fld id="{6F2DD505-E694-4C23-8402-9C491DB3C5BA}" type="datetimeFigureOut">
               <a:rPr lang="en-US" smtClean="0"/>
-              <a:t>7/25/2024</a:t>
+              <a:t>7/31/2024</a:t>
             </a:fld>
             <a:endParaRPr lang="en-US"/>
           </a:p>
@@ -1817,7 +1817,7 @@
           <a:p>
             <a:fld id="{6F2DD505-E694-4C23-8402-9C491DB3C5BA}" type="datetimeFigureOut">
               <a:rPr lang="en-US" smtClean="0"/>
-              <a:t>7/25/2024</a:t>
+              <a:t>7/31/2024</a:t>
             </a:fld>
             <a:endParaRPr lang="en-US"/>
           </a:p>
@@ -1958,7 +1958,7 @@
           <a:p>
             <a:fld id="{6F2DD505-E694-4C23-8402-9C491DB3C5BA}" type="datetimeFigureOut">
               <a:rPr lang="en-US" smtClean="0"/>
-              <a:t>7/25/2024</a:t>
+              <a:t>7/31/2024</a:t>
             </a:fld>
             <a:endParaRPr lang="en-US"/>
           </a:p>
@@ -2071,7 +2071,7 @@
           <a:p>
             <a:fld id="{6F2DD505-E694-4C23-8402-9C491DB3C5BA}" type="datetimeFigureOut">
               <a:rPr lang="en-US" smtClean="0"/>
-              <a:t>7/25/2024</a:t>
+              <a:t>7/31/2024</a:t>
             </a:fld>
             <a:endParaRPr lang="en-US"/>
           </a:p>
@@ -2382,7 +2382,7 @@
           <a:p>
             <a:fld id="{6F2DD505-E694-4C23-8402-9C491DB3C5BA}" type="datetimeFigureOut">
               <a:rPr lang="en-US" smtClean="0"/>
-              <a:t>7/25/2024</a:t>
+              <a:t>7/31/2024</a:t>
             </a:fld>
             <a:endParaRPr lang="en-US"/>
           </a:p>
@@ -2670,7 +2670,7 @@
           <a:p>
             <a:fld id="{6F2DD505-E694-4C23-8402-9C491DB3C5BA}" type="datetimeFigureOut">
               <a:rPr lang="en-US" smtClean="0"/>
-              <a:t>7/25/2024</a:t>
+              <a:t>7/31/2024</a:t>
             </a:fld>
             <a:endParaRPr lang="en-US"/>
           </a:p>
@@ -2911,7 +2911,7 @@
           <a:p>
             <a:fld id="{6F2DD505-E694-4C23-8402-9C491DB3C5BA}" type="datetimeFigureOut">
               <a:rPr lang="en-US" smtClean="0"/>
-              <a:t>7/25/2024</a:t>
+              <a:t>7/31/2024</a:t>
             </a:fld>
             <a:endParaRPr lang="en-US"/>
           </a:p>
@@ -3378,7 +3378,7 @@
         <p:spPr>
           <a:xfrm>
             <a:off x="816076" y="1641987"/>
-            <a:ext cx="10087897" cy="4247317"/>
+            <a:ext cx="10087897" cy="4524315"/>
           </a:xfrm>
           <a:prstGeom prst="rect">
             <a:avLst/>
@@ -3444,7 +3444,7 @@
               <a:buAutoNum type="arabicPeriod"/>
             </a:pPr>
             <a:r>
-              <a:rPr lang="en-US" dirty="0">
+              <a:rPr lang="en-US" strike="sngStrike" dirty="0">
                 <a:highlight>
                   <a:srgbClr val="00FFFF"/>
                 </a:highlight>
@@ -3458,7 +3458,7 @@
               <a:buAutoNum type="arabicPeriod"/>
             </a:pPr>
             <a:r>
-              <a:rPr lang="en-US" dirty="0">
+              <a:rPr lang="en-US" strike="sngStrike" dirty="0">
                 <a:highlight>
                   <a:srgbClr val="00FFFF"/>
                 </a:highlight>
@@ -3472,7 +3472,7 @@
               <a:buAutoNum type="arabicPeriod"/>
             </a:pPr>
             <a:r>
-              <a:rPr lang="en-US" dirty="0">
+              <a:rPr lang="en-US" strike="sngStrike" dirty="0">
                 <a:highlight>
                   <a:srgbClr val="00FFFF"/>
                 </a:highlight>
@@ -3486,7 +3486,7 @@
               <a:buAutoNum type="arabicPeriod"/>
             </a:pPr>
             <a:r>
-              <a:rPr lang="en-US" dirty="0">
+              <a:rPr lang="en-US" strike="sngStrike" dirty="0">
                 <a:highlight>
                   <a:srgbClr val="00FFFF"/>
                 </a:highlight>
@@ -3514,7 +3514,7 @@
               <a:buAutoNum type="arabicPeriod"/>
             </a:pPr>
             <a:r>
-              <a:rPr lang="en-US" dirty="0">
+              <a:rPr lang="en-US" strike="sngStrike" dirty="0">
                 <a:highlight>
                   <a:srgbClr val="00FFFF"/>
                 </a:highlight>
@@ -3534,6 +3534,20 @@
                 </a:highlight>
               </a:rPr>
               <a:t>Describe details about the crimes committed at each location</a:t>
+            </a:r>
+          </a:p>
+          <a:p>
+            <a:pPr marL="342900" indent="-342900">
+              <a:buFont typeface="+mj-lt"/>
+              <a:buAutoNum type="arabicPeriod"/>
+            </a:pPr>
+            <a:r>
+              <a:rPr lang="en-US" dirty="0">
+                <a:highlight>
+                  <a:srgbClr val="00FF00"/>
+                </a:highlight>
+              </a:rPr>
+              <a:t>Percentile for crime density compared to other addresses in Minneapolis</a:t>
             </a:r>
           </a:p>
           <a:p>

</xml_diff>

<commit_message>
Add icons for each crime to map
</commit_message>
<xml_diff>
--- a/Mockups.pptx
+++ b/Mockups.pptx
@@ -3378,7 +3378,7 @@
         <p:spPr>
           <a:xfrm>
             <a:off x="816076" y="1641987"/>
-            <a:ext cx="10087897" cy="4524315"/>
+            <a:ext cx="10087897" cy="4801314"/>
           </a:xfrm>
           <a:prstGeom prst="rect">
             <a:avLst/>
@@ -3534,6 +3534,20 @@
                 </a:highlight>
               </a:rPr>
               <a:t>Describe details about the crimes committed at each location</a:t>
+            </a:r>
+          </a:p>
+          <a:p>
+            <a:pPr marL="1257300" lvl="2" indent="-342900">
+              <a:buFont typeface="+mj-lt"/>
+              <a:buAutoNum type="arabicPeriod"/>
+            </a:pPr>
+            <a:r>
+              <a:rPr lang="en-US" dirty="0">
+                <a:highlight>
+                  <a:srgbClr val="00FF00"/>
+                </a:highlight>
+              </a:rPr>
+              <a:t>Make clickable icons for each type of crime</a:t>
             </a:r>
           </a:p>
           <a:p>

</xml_diff>